<commit_message>
Add simple tbb:::parallel_reduce example slide
</commit_message>
<xml_diff>
--- a/CPlusPlus/Tbb/tbb.pptx
+++ b/CPlusPlus/Tbb/tbb.pptx
@@ -11132,7 +11132,7 @@
         <p:spPr>
           <a:xfrm>
             <a:off x="1458843" y="1478243"/>
-            <a:ext cx="8937062" cy="4770537"/>
+            <a:ext cx="8937062" cy="5262979"/>
           </a:xfrm>
           <a:prstGeom prst="rect">
             <a:avLst/>
@@ -11158,14 +11158,6 @@
               <a:rPr lang="en-US" sz="1600" dirty="0">
                 <a:latin typeface="Consolas" panose="020B0609020204030204" pitchFamily="49" charset="0"/>
               </a:rPr>
-              <a:t>#include &lt;algorithm&gt;</a:t>
-            </a:r>
-          </a:p>
-          <a:p>
-            <a:r>
-              <a:rPr lang="en-US" sz="1600" dirty="0">
-                <a:latin typeface="Consolas" panose="020B0609020204030204" pitchFamily="49" charset="0"/>
-              </a:rPr>
               <a:t>#include &lt;</a:t>
             </a:r>
             <a:r>
@@ -11257,7 +11249,19 @@
               <a:rPr lang="en-US" sz="1600" dirty="0">
                 <a:latin typeface="Consolas" panose="020B0609020204030204" pitchFamily="49" charset="0"/>
               </a:rPr>
-              <a:t> main() {</a:t>
+              <a:t> </a:t>
+            </a:r>
+            <a:r>
+              <a:rPr lang="en-US" sz="1600" dirty="0" smtClean="0">
+                <a:latin typeface="Consolas" panose="020B0609020204030204" pitchFamily="49" charset="0"/>
+              </a:rPr>
+              <a:t>main() </a:t>
+            </a:r>
+            <a:r>
+              <a:rPr lang="en-US" sz="1600" dirty="0">
+                <a:latin typeface="Consolas" panose="020B0609020204030204" pitchFamily="49" charset="0"/>
+              </a:rPr>
+              <a:t>{</a:t>
             </a:r>
           </a:p>
           <a:p>
@@ -11269,6 +11273,44 @@
             </a:r>
             <a:r>
               <a:rPr lang="en-US" sz="1600" dirty="0" err="1">
+                <a:latin typeface="Consolas" panose="020B0609020204030204" pitchFamily="49" charset="0"/>
+              </a:rPr>
+              <a:t>std</a:t>
+            </a:r>
+            <a:r>
+              <a:rPr lang="en-US" sz="1600" dirty="0">
+                <a:latin typeface="Consolas" panose="020B0609020204030204" pitchFamily="49" charset="0"/>
+              </a:rPr>
+              <a:t>::</a:t>
+            </a:r>
+            <a:r>
+              <a:rPr lang="en-US" sz="1600" dirty="0" err="1">
+                <a:latin typeface="Consolas" panose="020B0609020204030204" pitchFamily="49" charset="0"/>
+              </a:rPr>
+              <a:t>size_t</a:t>
+            </a:r>
+            <a:r>
+              <a:rPr lang="en-US" sz="1600" dirty="0">
+                <a:latin typeface="Consolas" panose="020B0609020204030204" pitchFamily="49" charset="0"/>
+              </a:rPr>
+              <a:t> </a:t>
+            </a:r>
+            <a:r>
+              <a:rPr lang="en-US" sz="1600" dirty="0" err="1">
+                <a:latin typeface="Consolas" panose="020B0609020204030204" pitchFamily="49" charset="0"/>
+              </a:rPr>
+              <a:t>grain_size</a:t>
+            </a:r>
+            <a:r>
+              <a:rPr lang="en-US" sz="1600" dirty="0">
+                <a:latin typeface="Consolas" panose="020B0609020204030204" pitchFamily="49" charset="0"/>
+              </a:rPr>
+              <a:t> {1000};</a:t>
+            </a:r>
+          </a:p>
+          <a:p>
+            <a:r>
+              <a:rPr lang="en-US" sz="1600" dirty="0" err="1" smtClean="0">
                 <a:latin typeface="Consolas" panose="020B0609020204030204" pitchFamily="49" charset="0"/>
               </a:rPr>
               <a:t>std</a:t>
@@ -11358,398 +11400,627 @@
             </a:r>
           </a:p>
           <a:p>
-            <a:endParaRPr lang="en-US" sz="1600" dirty="0" smtClean="0">
+            <a:r>
+              <a:rPr lang="en-US" sz="1600" b="1" dirty="0">
+                <a:solidFill>
+                  <a:srgbClr val="C00000"/>
+                </a:solidFill>
+                <a:latin typeface="Consolas" panose="020B0609020204030204" pitchFamily="49" charset="0"/>
+              </a:rPr>
+              <a:t>    </a:t>
+            </a:r>
+            <a:r>
+              <a:rPr lang="en-US" sz="1600" b="1" dirty="0" err="1">
+                <a:solidFill>
+                  <a:srgbClr val="C00000"/>
+                </a:solidFill>
+                <a:latin typeface="Consolas" panose="020B0609020204030204" pitchFamily="49" charset="0"/>
+              </a:rPr>
+              <a:t>int</a:t>
+            </a:r>
+            <a:r>
+              <a:rPr lang="en-US" sz="1600" b="1" dirty="0">
+                <a:solidFill>
+                  <a:srgbClr val="C00000"/>
+                </a:solidFill>
+                <a:latin typeface="Consolas" panose="020B0609020204030204" pitchFamily="49" charset="0"/>
+              </a:rPr>
+              <a:t> sum = </a:t>
+            </a:r>
+            <a:r>
+              <a:rPr lang="en-US" sz="1600" b="1" dirty="0" err="1">
+                <a:solidFill>
+                  <a:srgbClr val="C00000"/>
+                </a:solidFill>
+                <a:latin typeface="Consolas" panose="020B0609020204030204" pitchFamily="49" charset="0"/>
+              </a:rPr>
+              <a:t>tbb</a:t>
+            </a:r>
+            <a:r>
+              <a:rPr lang="en-US" sz="1600" b="1" dirty="0">
+                <a:solidFill>
+                  <a:srgbClr val="C00000"/>
+                </a:solidFill>
+                <a:latin typeface="Consolas" panose="020B0609020204030204" pitchFamily="49" charset="0"/>
+              </a:rPr>
+              <a:t>::</a:t>
+            </a:r>
+            <a:r>
+              <a:rPr lang="en-US" sz="1600" b="1" dirty="0" err="1">
+                <a:solidFill>
+                  <a:srgbClr val="C00000"/>
+                </a:solidFill>
+                <a:latin typeface="Consolas" panose="020B0609020204030204" pitchFamily="49" charset="0"/>
+              </a:rPr>
+              <a:t>parallel_reduce</a:t>
+            </a:r>
+            <a:r>
+              <a:rPr lang="en-US" sz="1600" b="1" dirty="0">
+                <a:solidFill>
+                  <a:srgbClr val="C00000"/>
+                </a:solidFill>
+                <a:latin typeface="Consolas" panose="020B0609020204030204" pitchFamily="49" charset="0"/>
+              </a:rPr>
+              <a:t>(</a:t>
+            </a:r>
+          </a:p>
+          <a:p>
+            <a:r>
+              <a:rPr lang="en-US" sz="1600" b="1" dirty="0">
+                <a:solidFill>
+                  <a:srgbClr val="C00000"/>
+                </a:solidFill>
+                <a:latin typeface="Consolas" panose="020B0609020204030204" pitchFamily="49" charset="0"/>
+              </a:rPr>
+              <a:t>            </a:t>
+            </a:r>
+            <a:r>
+              <a:rPr lang="en-US" sz="1600" b="1" dirty="0" err="1">
+                <a:solidFill>
+                  <a:srgbClr val="C00000"/>
+                </a:solidFill>
+                <a:latin typeface="Consolas" panose="020B0609020204030204" pitchFamily="49" charset="0"/>
+              </a:rPr>
+              <a:t>tbb</a:t>
+            </a:r>
+            <a:r>
+              <a:rPr lang="en-US" sz="1600" b="1" dirty="0">
+                <a:solidFill>
+                  <a:srgbClr val="C00000"/>
+                </a:solidFill>
+                <a:latin typeface="Consolas" panose="020B0609020204030204" pitchFamily="49" charset="0"/>
+              </a:rPr>
+              <a:t>::</a:t>
+            </a:r>
+            <a:r>
+              <a:rPr lang="en-US" sz="1600" b="1" dirty="0" err="1">
+                <a:solidFill>
+                  <a:srgbClr val="C00000"/>
+                </a:solidFill>
+                <a:latin typeface="Consolas" panose="020B0609020204030204" pitchFamily="49" charset="0"/>
+              </a:rPr>
+              <a:t>blocked_range</a:t>
+            </a:r>
+            <a:r>
+              <a:rPr lang="en-US" sz="1600" b="1" dirty="0">
+                <a:solidFill>
+                  <a:srgbClr val="C00000"/>
+                </a:solidFill>
+                <a:latin typeface="Consolas" panose="020B0609020204030204" pitchFamily="49" charset="0"/>
+              </a:rPr>
+              <a:t>&lt;</a:t>
+            </a:r>
+            <a:r>
+              <a:rPr lang="en-US" sz="1600" b="1" dirty="0" err="1">
+                <a:solidFill>
+                  <a:srgbClr val="C00000"/>
+                </a:solidFill>
+                <a:latin typeface="Consolas" panose="020B0609020204030204" pitchFamily="49" charset="0"/>
+              </a:rPr>
+              <a:t>std</a:t>
+            </a:r>
+            <a:r>
+              <a:rPr lang="en-US" sz="1600" b="1" dirty="0">
+                <a:solidFill>
+                  <a:srgbClr val="C00000"/>
+                </a:solidFill>
+                <a:latin typeface="Consolas" panose="020B0609020204030204" pitchFamily="49" charset="0"/>
+              </a:rPr>
+              <a:t>::</a:t>
+            </a:r>
+            <a:r>
+              <a:rPr lang="en-US" sz="1600" b="1" dirty="0" err="1">
+                <a:solidFill>
+                  <a:srgbClr val="C00000"/>
+                </a:solidFill>
+                <a:latin typeface="Consolas" panose="020B0609020204030204" pitchFamily="49" charset="0"/>
+              </a:rPr>
+              <a:t>size_t</a:t>
+            </a:r>
+            <a:r>
+              <a:rPr lang="en-US" sz="1600" b="1" dirty="0">
+                <a:solidFill>
+                  <a:srgbClr val="C00000"/>
+                </a:solidFill>
+                <a:latin typeface="Consolas" panose="020B0609020204030204" pitchFamily="49" charset="0"/>
+              </a:rPr>
+              <a:t>&gt;(0ul, </a:t>
+            </a:r>
+            <a:r>
+              <a:rPr lang="en-US" sz="1600" b="1" dirty="0" err="1">
+                <a:solidFill>
+                  <a:srgbClr val="C00000"/>
+                </a:solidFill>
+                <a:latin typeface="Consolas" panose="020B0609020204030204" pitchFamily="49" charset="0"/>
+              </a:rPr>
+              <a:t>data.size</a:t>
+            </a:r>
+            <a:r>
+              <a:rPr lang="en-US" sz="1600" b="1" dirty="0">
+                <a:solidFill>
+                  <a:srgbClr val="C00000"/>
+                </a:solidFill>
+                <a:latin typeface="Consolas" panose="020B0609020204030204" pitchFamily="49" charset="0"/>
+              </a:rPr>
+              <a:t>(), </a:t>
+            </a:r>
+            <a:r>
+              <a:rPr lang="en-US" sz="1600" b="1" dirty="0" err="1">
+                <a:solidFill>
+                  <a:srgbClr val="C00000"/>
+                </a:solidFill>
+                <a:latin typeface="Consolas" panose="020B0609020204030204" pitchFamily="49" charset="0"/>
+              </a:rPr>
+              <a:t>grain_size</a:t>
+            </a:r>
+            <a:r>
+              <a:rPr lang="en-US" sz="1600" b="1" dirty="0">
+                <a:solidFill>
+                  <a:srgbClr val="C00000"/>
+                </a:solidFill>
+                <a:latin typeface="Consolas" panose="020B0609020204030204" pitchFamily="49" charset="0"/>
+              </a:rPr>
+              <a:t>), 0,</a:t>
+            </a:r>
+          </a:p>
+          <a:p>
+            <a:r>
+              <a:rPr lang="en-US" sz="1600" b="1" dirty="0">
+                <a:solidFill>
+                  <a:srgbClr val="C00000"/>
+                </a:solidFill>
+                <a:latin typeface="Consolas" panose="020B0609020204030204" pitchFamily="49" charset="0"/>
+              </a:rPr>
+              <a:t>            [&amp;data] (</a:t>
+            </a:r>
+            <a:r>
+              <a:rPr lang="en-US" sz="1600" b="1" dirty="0" err="1">
+                <a:solidFill>
+                  <a:srgbClr val="C00000"/>
+                </a:solidFill>
+                <a:latin typeface="Consolas" panose="020B0609020204030204" pitchFamily="49" charset="0"/>
+              </a:rPr>
+              <a:t>const</a:t>
+            </a:r>
+            <a:r>
+              <a:rPr lang="en-US" sz="1600" b="1" dirty="0">
+                <a:solidFill>
+                  <a:srgbClr val="C00000"/>
+                </a:solidFill>
+                <a:latin typeface="Consolas" panose="020B0609020204030204" pitchFamily="49" charset="0"/>
+              </a:rPr>
+              <a:t> </a:t>
+            </a:r>
+            <a:r>
+              <a:rPr lang="en-US" sz="1600" b="1" dirty="0" err="1">
+                <a:solidFill>
+                  <a:srgbClr val="C00000"/>
+                </a:solidFill>
+                <a:latin typeface="Consolas" panose="020B0609020204030204" pitchFamily="49" charset="0"/>
+              </a:rPr>
+              <a:t>tbb</a:t>
+            </a:r>
+            <a:r>
+              <a:rPr lang="en-US" sz="1600" b="1" dirty="0">
+                <a:solidFill>
+                  <a:srgbClr val="C00000"/>
+                </a:solidFill>
+                <a:latin typeface="Consolas" panose="020B0609020204030204" pitchFamily="49" charset="0"/>
+              </a:rPr>
+              <a:t>::</a:t>
+            </a:r>
+            <a:r>
+              <a:rPr lang="en-US" sz="1600" b="1" dirty="0" err="1">
+                <a:solidFill>
+                  <a:srgbClr val="C00000"/>
+                </a:solidFill>
+                <a:latin typeface="Consolas" panose="020B0609020204030204" pitchFamily="49" charset="0"/>
+              </a:rPr>
+              <a:t>blocked_range</a:t>
+            </a:r>
+            <a:r>
+              <a:rPr lang="en-US" sz="1600" b="1" dirty="0">
+                <a:solidFill>
+                  <a:srgbClr val="C00000"/>
+                </a:solidFill>
+                <a:latin typeface="Consolas" panose="020B0609020204030204" pitchFamily="49" charset="0"/>
+              </a:rPr>
+              <a:t>&lt;</a:t>
+            </a:r>
+            <a:r>
+              <a:rPr lang="en-US" sz="1600" b="1" dirty="0" err="1">
+                <a:solidFill>
+                  <a:srgbClr val="C00000"/>
+                </a:solidFill>
+                <a:latin typeface="Consolas" panose="020B0609020204030204" pitchFamily="49" charset="0"/>
+              </a:rPr>
+              <a:t>std</a:t>
+            </a:r>
+            <a:r>
+              <a:rPr lang="en-US" sz="1600" b="1" dirty="0">
+                <a:solidFill>
+                  <a:srgbClr val="C00000"/>
+                </a:solidFill>
+                <a:latin typeface="Consolas" panose="020B0609020204030204" pitchFamily="49" charset="0"/>
+              </a:rPr>
+              <a:t>::</a:t>
+            </a:r>
+            <a:r>
+              <a:rPr lang="en-US" sz="1600" b="1" dirty="0" err="1">
+                <a:solidFill>
+                  <a:srgbClr val="C00000"/>
+                </a:solidFill>
+                <a:latin typeface="Consolas" panose="020B0609020204030204" pitchFamily="49" charset="0"/>
+              </a:rPr>
+              <a:t>size_t</a:t>
+            </a:r>
+            <a:r>
+              <a:rPr lang="en-US" sz="1600" b="1" dirty="0">
+                <a:solidFill>
+                  <a:srgbClr val="C00000"/>
+                </a:solidFill>
+                <a:latin typeface="Consolas" panose="020B0609020204030204" pitchFamily="49" charset="0"/>
+              </a:rPr>
+              <a:t>&gt;&amp; range, </a:t>
+            </a:r>
+            <a:r>
+              <a:rPr lang="en-US" sz="1600" b="1" dirty="0" err="1">
+                <a:solidFill>
+                  <a:srgbClr val="C00000"/>
+                </a:solidFill>
+                <a:latin typeface="Consolas" panose="020B0609020204030204" pitchFamily="49" charset="0"/>
+              </a:rPr>
+              <a:t>int</a:t>
+            </a:r>
+            <a:r>
+              <a:rPr lang="en-US" sz="1600" b="1" dirty="0">
+                <a:solidFill>
+                  <a:srgbClr val="C00000"/>
+                </a:solidFill>
+                <a:latin typeface="Consolas" panose="020B0609020204030204" pitchFamily="49" charset="0"/>
+              </a:rPr>
+              <a:t> </a:t>
+            </a:r>
+            <a:r>
+              <a:rPr lang="en-US" sz="1600" b="1" dirty="0" err="1">
+                <a:solidFill>
+                  <a:srgbClr val="C00000"/>
+                </a:solidFill>
+                <a:latin typeface="Consolas" panose="020B0609020204030204" pitchFamily="49" charset="0"/>
+              </a:rPr>
+              <a:t>init</a:t>
+            </a:r>
+            <a:r>
+              <a:rPr lang="en-US" sz="1600" b="1" dirty="0">
+                <a:solidFill>
+                  <a:srgbClr val="C00000"/>
+                </a:solidFill>
+                <a:latin typeface="Consolas" panose="020B0609020204030204" pitchFamily="49" charset="0"/>
+              </a:rPr>
+              <a:t>) {</a:t>
+            </a:r>
+          </a:p>
+          <a:p>
+            <a:r>
+              <a:rPr lang="en-US" sz="1600" b="1" dirty="0">
+                <a:solidFill>
+                  <a:srgbClr val="C00000"/>
+                </a:solidFill>
+                <a:latin typeface="Consolas" panose="020B0609020204030204" pitchFamily="49" charset="0"/>
+              </a:rPr>
+              <a:t>                for (</a:t>
+            </a:r>
+            <a:r>
+              <a:rPr lang="en-US" sz="1600" b="1" dirty="0" err="1">
+                <a:solidFill>
+                  <a:srgbClr val="C00000"/>
+                </a:solidFill>
+                <a:latin typeface="Consolas" panose="020B0609020204030204" pitchFamily="49" charset="0"/>
+              </a:rPr>
+              <a:t>std</a:t>
+            </a:r>
+            <a:r>
+              <a:rPr lang="en-US" sz="1600" b="1" dirty="0">
+                <a:solidFill>
+                  <a:srgbClr val="C00000"/>
+                </a:solidFill>
+                <a:latin typeface="Consolas" panose="020B0609020204030204" pitchFamily="49" charset="0"/>
+              </a:rPr>
+              <a:t>::</a:t>
+            </a:r>
+            <a:r>
+              <a:rPr lang="en-US" sz="1600" b="1" dirty="0" err="1">
+                <a:solidFill>
+                  <a:srgbClr val="C00000"/>
+                </a:solidFill>
+                <a:latin typeface="Consolas" panose="020B0609020204030204" pitchFamily="49" charset="0"/>
+              </a:rPr>
+              <a:t>size_t</a:t>
+            </a:r>
+            <a:r>
+              <a:rPr lang="en-US" sz="1600" b="1" dirty="0">
+                <a:solidFill>
+                  <a:srgbClr val="C00000"/>
+                </a:solidFill>
+                <a:latin typeface="Consolas" panose="020B0609020204030204" pitchFamily="49" charset="0"/>
+              </a:rPr>
+              <a:t> </a:t>
+            </a:r>
+            <a:r>
+              <a:rPr lang="en-US" sz="1600" b="1" dirty="0" err="1">
+                <a:solidFill>
+                  <a:srgbClr val="C00000"/>
+                </a:solidFill>
+                <a:latin typeface="Consolas" panose="020B0609020204030204" pitchFamily="49" charset="0"/>
+              </a:rPr>
+              <a:t>i</a:t>
+            </a:r>
+            <a:r>
+              <a:rPr lang="en-US" sz="1600" b="1" dirty="0">
+                <a:solidFill>
+                  <a:srgbClr val="C00000"/>
+                </a:solidFill>
+                <a:latin typeface="Consolas" panose="020B0609020204030204" pitchFamily="49" charset="0"/>
+              </a:rPr>
+              <a:t> = </a:t>
+            </a:r>
+            <a:r>
+              <a:rPr lang="en-US" sz="1600" b="1" dirty="0" err="1">
+                <a:solidFill>
+                  <a:srgbClr val="C00000"/>
+                </a:solidFill>
+                <a:latin typeface="Consolas" panose="020B0609020204030204" pitchFamily="49" charset="0"/>
+              </a:rPr>
+              <a:t>range.begin</a:t>
+            </a:r>
+            <a:r>
+              <a:rPr lang="en-US" sz="1600" b="1" dirty="0">
+                <a:solidFill>
+                  <a:srgbClr val="C00000"/>
+                </a:solidFill>
+                <a:latin typeface="Consolas" panose="020B0609020204030204" pitchFamily="49" charset="0"/>
+              </a:rPr>
+              <a:t>(); </a:t>
+            </a:r>
+            <a:r>
+              <a:rPr lang="en-US" sz="1600" b="1" dirty="0" err="1">
+                <a:solidFill>
+                  <a:srgbClr val="C00000"/>
+                </a:solidFill>
+                <a:latin typeface="Consolas" panose="020B0609020204030204" pitchFamily="49" charset="0"/>
+              </a:rPr>
+              <a:t>i</a:t>
+            </a:r>
+            <a:r>
+              <a:rPr lang="en-US" sz="1600" b="1" dirty="0">
+                <a:solidFill>
+                  <a:srgbClr val="C00000"/>
+                </a:solidFill>
+                <a:latin typeface="Consolas" panose="020B0609020204030204" pitchFamily="49" charset="0"/>
+              </a:rPr>
+              <a:t> &lt; </a:t>
+            </a:r>
+            <a:r>
+              <a:rPr lang="en-US" sz="1600" b="1" dirty="0" err="1">
+                <a:solidFill>
+                  <a:srgbClr val="C00000"/>
+                </a:solidFill>
+                <a:latin typeface="Consolas" panose="020B0609020204030204" pitchFamily="49" charset="0"/>
+              </a:rPr>
+              <a:t>range.end</a:t>
+            </a:r>
+            <a:r>
+              <a:rPr lang="en-US" sz="1600" b="1" dirty="0">
+                <a:solidFill>
+                  <a:srgbClr val="C00000"/>
+                </a:solidFill>
+                <a:latin typeface="Consolas" panose="020B0609020204030204" pitchFamily="49" charset="0"/>
+              </a:rPr>
+              <a:t>(); ++</a:t>
+            </a:r>
+            <a:r>
+              <a:rPr lang="en-US" sz="1600" b="1" dirty="0" err="1">
+                <a:solidFill>
+                  <a:srgbClr val="C00000"/>
+                </a:solidFill>
+                <a:latin typeface="Consolas" panose="020B0609020204030204" pitchFamily="49" charset="0"/>
+              </a:rPr>
+              <a:t>i</a:t>
+            </a:r>
+            <a:r>
+              <a:rPr lang="en-US" sz="1600" b="1" dirty="0">
+                <a:solidFill>
+                  <a:srgbClr val="C00000"/>
+                </a:solidFill>
+                <a:latin typeface="Consolas" panose="020B0609020204030204" pitchFamily="49" charset="0"/>
+              </a:rPr>
+              <a:t>)</a:t>
+            </a:r>
+          </a:p>
+          <a:p>
+            <a:r>
+              <a:rPr lang="en-US" sz="1600" b="1" dirty="0">
+                <a:solidFill>
+                  <a:srgbClr val="C00000"/>
+                </a:solidFill>
+                <a:latin typeface="Consolas" panose="020B0609020204030204" pitchFamily="49" charset="0"/>
+              </a:rPr>
+              <a:t>                    </a:t>
+            </a:r>
+            <a:r>
+              <a:rPr lang="en-US" sz="1600" b="1" dirty="0" err="1">
+                <a:solidFill>
+                  <a:srgbClr val="C00000"/>
+                </a:solidFill>
+                <a:latin typeface="Consolas" panose="020B0609020204030204" pitchFamily="49" charset="0"/>
+              </a:rPr>
+              <a:t>init</a:t>
+            </a:r>
+            <a:r>
+              <a:rPr lang="en-US" sz="1600" b="1" dirty="0">
+                <a:solidFill>
+                  <a:srgbClr val="C00000"/>
+                </a:solidFill>
+                <a:latin typeface="Consolas" panose="020B0609020204030204" pitchFamily="49" charset="0"/>
+              </a:rPr>
+              <a:t> += data[</a:t>
+            </a:r>
+            <a:r>
+              <a:rPr lang="en-US" sz="1600" b="1" dirty="0" err="1">
+                <a:solidFill>
+                  <a:srgbClr val="C00000"/>
+                </a:solidFill>
+                <a:latin typeface="Consolas" panose="020B0609020204030204" pitchFamily="49" charset="0"/>
+              </a:rPr>
+              <a:t>i</a:t>
+            </a:r>
+            <a:r>
+              <a:rPr lang="en-US" sz="1600" b="1" dirty="0">
+                <a:solidFill>
+                  <a:srgbClr val="C00000"/>
+                </a:solidFill>
+                <a:latin typeface="Consolas" panose="020B0609020204030204" pitchFamily="49" charset="0"/>
+              </a:rPr>
+              <a:t>];</a:t>
+            </a:r>
+          </a:p>
+          <a:p>
+            <a:r>
+              <a:rPr lang="en-US" sz="1600" b="1" dirty="0">
+                <a:solidFill>
+                  <a:srgbClr val="C00000"/>
+                </a:solidFill>
+                <a:latin typeface="Consolas" panose="020B0609020204030204" pitchFamily="49" charset="0"/>
+              </a:rPr>
+              <a:t>                return </a:t>
+            </a:r>
+            <a:r>
+              <a:rPr lang="en-US" sz="1600" b="1" dirty="0" err="1">
+                <a:solidFill>
+                  <a:srgbClr val="C00000"/>
+                </a:solidFill>
+                <a:latin typeface="Consolas" panose="020B0609020204030204" pitchFamily="49" charset="0"/>
+              </a:rPr>
+              <a:t>init</a:t>
+            </a:r>
+            <a:r>
+              <a:rPr lang="en-US" sz="1600" b="1" dirty="0">
+                <a:solidFill>
+                  <a:srgbClr val="C00000"/>
+                </a:solidFill>
+                <a:latin typeface="Consolas" panose="020B0609020204030204" pitchFamily="49" charset="0"/>
+              </a:rPr>
+              <a:t>;</a:t>
+            </a:r>
+          </a:p>
+          <a:p>
+            <a:r>
+              <a:rPr lang="en-US" sz="1600" b="1" dirty="0">
+                <a:solidFill>
+                  <a:srgbClr val="C00000"/>
+                </a:solidFill>
+                <a:latin typeface="Consolas" panose="020B0609020204030204" pitchFamily="49" charset="0"/>
+              </a:rPr>
+              <a:t>            },</a:t>
+            </a:r>
+          </a:p>
+          <a:p>
+            <a:r>
+              <a:rPr lang="en-US" sz="1600" b="1" dirty="0">
+                <a:solidFill>
+                  <a:srgbClr val="C00000"/>
+                </a:solidFill>
+                <a:latin typeface="Consolas" panose="020B0609020204030204" pitchFamily="49" charset="0"/>
+              </a:rPr>
+              <a:t>            [] (</a:t>
+            </a:r>
+            <a:r>
+              <a:rPr lang="en-US" sz="1600" b="1" dirty="0" err="1">
+                <a:solidFill>
+                  <a:srgbClr val="C00000"/>
+                </a:solidFill>
+                <a:latin typeface="Consolas" panose="020B0609020204030204" pitchFamily="49" charset="0"/>
+              </a:rPr>
+              <a:t>int</a:t>
+            </a:r>
+            <a:r>
+              <a:rPr lang="en-US" sz="1600" b="1" dirty="0">
+                <a:solidFill>
+                  <a:srgbClr val="C00000"/>
+                </a:solidFill>
+                <a:latin typeface="Consolas" panose="020B0609020204030204" pitchFamily="49" charset="0"/>
+              </a:rPr>
+              <a:t> x, </a:t>
+            </a:r>
+            <a:r>
+              <a:rPr lang="en-US" sz="1600" b="1" dirty="0" err="1">
+                <a:solidFill>
+                  <a:srgbClr val="C00000"/>
+                </a:solidFill>
+                <a:latin typeface="Consolas" panose="020B0609020204030204" pitchFamily="49" charset="0"/>
+              </a:rPr>
+              <a:t>int</a:t>
+            </a:r>
+            <a:r>
+              <a:rPr lang="en-US" sz="1600" b="1" dirty="0">
+                <a:solidFill>
+                  <a:srgbClr val="C00000"/>
+                </a:solidFill>
+                <a:latin typeface="Consolas" panose="020B0609020204030204" pitchFamily="49" charset="0"/>
+              </a:rPr>
+              <a:t> y) { return x + y; }</a:t>
+            </a:r>
+          </a:p>
+          <a:p>
+            <a:r>
+              <a:rPr lang="en-US" sz="1600" b="1" dirty="0">
+                <a:solidFill>
+                  <a:srgbClr val="C00000"/>
+                </a:solidFill>
+                <a:latin typeface="Consolas" panose="020B0609020204030204" pitchFamily="49" charset="0"/>
+              </a:rPr>
+              <a:t>    );</a:t>
+            </a:r>
+          </a:p>
+          <a:p>
+            <a:r>
+              <a:rPr lang="en-US" sz="1600" dirty="0">
+                <a:latin typeface="Consolas" panose="020B0609020204030204" pitchFamily="49" charset="0"/>
+              </a:rPr>
+              <a:t> </a:t>
+            </a:r>
+            <a:r>
+              <a:rPr lang="en-US" sz="1600" dirty="0" smtClean="0">
+                <a:latin typeface="Consolas" panose="020B0609020204030204" pitchFamily="49" charset="0"/>
+              </a:rPr>
+              <a:t>   …</a:t>
+            </a:r>
+            <a:endParaRPr lang="en-US" sz="1600" dirty="0">
               <a:latin typeface="Consolas" panose="020B0609020204030204" pitchFamily="49" charset="0"/>
             </a:endParaRPr>
           </a:p>
           <a:p>
             <a:r>
-              <a:rPr lang="en-US" sz="1600" dirty="0" smtClean="0">
-                <a:latin typeface="Consolas" panose="020B0609020204030204" pitchFamily="49" charset="0"/>
-              </a:rPr>
-              <a:t>    </a:t>
-            </a:r>
-            <a:r>
-              <a:rPr lang="en-US" sz="1600" dirty="0" err="1" smtClean="0">
-                <a:latin typeface="Consolas" panose="020B0609020204030204" pitchFamily="49" charset="0"/>
-              </a:rPr>
-              <a:t>std</a:t>
-            </a:r>
-            <a:r>
-              <a:rPr lang="en-US" sz="1600" dirty="0">
-                <a:latin typeface="Consolas" panose="020B0609020204030204" pitchFamily="49" charset="0"/>
-              </a:rPr>
-              <a:t>::</a:t>
-            </a:r>
-            <a:r>
-              <a:rPr lang="en-US" sz="1600" dirty="0" err="1">
-                <a:latin typeface="Consolas" panose="020B0609020204030204" pitchFamily="49" charset="0"/>
-              </a:rPr>
-              <a:t>for_each</a:t>
-            </a:r>
-            <a:r>
-              <a:rPr lang="en-US" sz="1600" dirty="0">
-                <a:latin typeface="Consolas" panose="020B0609020204030204" pitchFamily="49" charset="0"/>
-              </a:rPr>
-              <a:t>(</a:t>
-            </a:r>
-            <a:r>
-              <a:rPr lang="en-US" sz="1600" dirty="0" err="1">
-                <a:latin typeface="Consolas" panose="020B0609020204030204" pitchFamily="49" charset="0"/>
-              </a:rPr>
-              <a:t>std</a:t>
-            </a:r>
-            <a:r>
-              <a:rPr lang="en-US" sz="1600" dirty="0">
-                <a:latin typeface="Consolas" panose="020B0609020204030204" pitchFamily="49" charset="0"/>
-              </a:rPr>
-              <a:t>::begin(data), </a:t>
-            </a:r>
-            <a:r>
-              <a:rPr lang="en-US" sz="1600" dirty="0" err="1">
-                <a:latin typeface="Consolas" panose="020B0609020204030204" pitchFamily="49" charset="0"/>
-              </a:rPr>
-              <a:t>std</a:t>
-            </a:r>
-            <a:r>
-              <a:rPr lang="en-US" sz="1600" dirty="0">
-                <a:latin typeface="Consolas" panose="020B0609020204030204" pitchFamily="49" charset="0"/>
-              </a:rPr>
-              <a:t>::end(data),</a:t>
-            </a:r>
-          </a:p>
-          <a:p>
-            <a:r>
-              <a:rPr lang="en-US" sz="1600" dirty="0">
-                <a:latin typeface="Consolas" panose="020B0609020204030204" pitchFamily="49" charset="0"/>
-              </a:rPr>
-              <a:t>                  [] (</a:t>
-            </a:r>
-            <a:r>
-              <a:rPr lang="en-US" sz="1600" dirty="0" err="1">
-                <a:latin typeface="Consolas" panose="020B0609020204030204" pitchFamily="49" charset="0"/>
-              </a:rPr>
-              <a:t>int</a:t>
-            </a:r>
-            <a:r>
-              <a:rPr lang="en-US" sz="1600" dirty="0">
-                <a:latin typeface="Consolas" panose="020B0609020204030204" pitchFamily="49" charset="0"/>
-              </a:rPr>
-              <a:t>&amp; </a:t>
-            </a:r>
-            <a:r>
-              <a:rPr lang="en-US" sz="1600" dirty="0" err="1">
-                <a:latin typeface="Consolas" panose="020B0609020204030204" pitchFamily="49" charset="0"/>
-              </a:rPr>
-              <a:t>i</a:t>
-            </a:r>
-            <a:r>
-              <a:rPr lang="en-US" sz="1600" dirty="0">
-                <a:latin typeface="Consolas" panose="020B0609020204030204" pitchFamily="49" charset="0"/>
-              </a:rPr>
-              <a:t>) { </a:t>
-            </a:r>
-            <a:r>
-              <a:rPr lang="en-US" sz="1600" dirty="0" err="1">
-                <a:latin typeface="Consolas" panose="020B0609020204030204" pitchFamily="49" charset="0"/>
-              </a:rPr>
-              <a:t>i</a:t>
-            </a:r>
-            <a:r>
-              <a:rPr lang="en-US" sz="1600" dirty="0">
-                <a:latin typeface="Consolas" panose="020B0609020204030204" pitchFamily="49" charset="0"/>
-              </a:rPr>
-              <a:t> = </a:t>
-            </a:r>
-            <a:r>
-              <a:rPr lang="en-US" sz="1600" dirty="0" err="1">
-                <a:latin typeface="Consolas" panose="020B0609020204030204" pitchFamily="49" charset="0"/>
-              </a:rPr>
-              <a:t>i</a:t>
-            </a:r>
-            <a:r>
-              <a:rPr lang="en-US" sz="1600" dirty="0">
-                <a:latin typeface="Consolas" panose="020B0609020204030204" pitchFamily="49" charset="0"/>
-              </a:rPr>
-              <a:t>*</a:t>
-            </a:r>
-            <a:r>
-              <a:rPr lang="en-US" sz="1600" dirty="0" err="1">
-                <a:latin typeface="Consolas" panose="020B0609020204030204" pitchFamily="49" charset="0"/>
-              </a:rPr>
-              <a:t>i</a:t>
-            </a:r>
-            <a:r>
-              <a:rPr lang="en-US" sz="1600" dirty="0">
-                <a:latin typeface="Consolas" panose="020B0609020204030204" pitchFamily="49" charset="0"/>
-              </a:rPr>
-              <a:t>; });</a:t>
-            </a:r>
-          </a:p>
-          <a:p>
-            <a:endParaRPr lang="en-US" sz="1600" dirty="0" smtClean="0">
-              <a:latin typeface="Consolas" panose="020B0609020204030204" pitchFamily="49" charset="0"/>
-            </a:endParaRPr>
-          </a:p>
-          <a:p>
-            <a:r>
-              <a:rPr lang="en-US" sz="1600" b="1" dirty="0" smtClean="0">
-                <a:solidFill>
-                  <a:srgbClr val="C00000"/>
-                </a:solidFill>
-                <a:latin typeface="Consolas" panose="020B0609020204030204" pitchFamily="49" charset="0"/>
-              </a:rPr>
-              <a:t>    </a:t>
-            </a:r>
-            <a:r>
-              <a:rPr lang="en-US" sz="1600" b="1" dirty="0" err="1" smtClean="0">
-                <a:solidFill>
-                  <a:srgbClr val="C00000"/>
-                </a:solidFill>
-                <a:latin typeface="Consolas" panose="020B0609020204030204" pitchFamily="49" charset="0"/>
-              </a:rPr>
-              <a:t>tbb</a:t>
-            </a:r>
-            <a:r>
-              <a:rPr lang="en-US" sz="1600" b="1" dirty="0">
-                <a:solidFill>
-                  <a:srgbClr val="C00000"/>
-                </a:solidFill>
-                <a:latin typeface="Consolas" panose="020B0609020204030204" pitchFamily="49" charset="0"/>
-              </a:rPr>
-              <a:t>::</a:t>
-            </a:r>
-            <a:r>
-              <a:rPr lang="en-US" sz="1600" b="1" dirty="0" err="1" smtClean="0">
-                <a:solidFill>
-                  <a:srgbClr val="C00000"/>
-                </a:solidFill>
-                <a:latin typeface="Consolas" panose="020B0609020204030204" pitchFamily="49" charset="0"/>
-              </a:rPr>
-              <a:t>parallel_for</a:t>
-            </a:r>
-            <a:r>
-              <a:rPr lang="en-US" sz="1600" b="1" dirty="0" smtClean="0">
-                <a:solidFill>
-                  <a:srgbClr val="C00000"/>
-                </a:solidFill>
-                <a:latin typeface="Consolas" panose="020B0609020204030204" pitchFamily="49" charset="0"/>
-              </a:rPr>
-              <a:t>(0ul, </a:t>
-            </a:r>
-            <a:r>
-              <a:rPr lang="en-US" sz="1600" b="1" dirty="0" err="1">
-                <a:solidFill>
-                  <a:srgbClr val="C00000"/>
-                </a:solidFill>
-                <a:latin typeface="Consolas" panose="020B0609020204030204" pitchFamily="49" charset="0"/>
-              </a:rPr>
-              <a:t>data.size</a:t>
-            </a:r>
-            <a:r>
-              <a:rPr lang="en-US" sz="1600" b="1" dirty="0">
-                <a:solidFill>
-                  <a:srgbClr val="C00000"/>
-                </a:solidFill>
-                <a:latin typeface="Consolas" panose="020B0609020204030204" pitchFamily="49" charset="0"/>
-              </a:rPr>
-              <a:t>(),</a:t>
-            </a:r>
-          </a:p>
-          <a:p>
-            <a:r>
-              <a:rPr lang="en-US" sz="1600" b="1" dirty="0">
-                <a:solidFill>
-                  <a:srgbClr val="C00000"/>
-                </a:solidFill>
-                <a:latin typeface="Consolas" panose="020B0609020204030204" pitchFamily="49" charset="0"/>
-              </a:rPr>
-              <a:t>                      [&amp;data] (</a:t>
-            </a:r>
-            <a:r>
-              <a:rPr lang="en-US" sz="1600" b="1" dirty="0" err="1">
-                <a:solidFill>
-                  <a:srgbClr val="C00000"/>
-                </a:solidFill>
-                <a:latin typeface="Consolas" panose="020B0609020204030204" pitchFamily="49" charset="0"/>
-              </a:rPr>
-              <a:t>std</a:t>
-            </a:r>
-            <a:r>
-              <a:rPr lang="en-US" sz="1600" b="1" dirty="0">
-                <a:solidFill>
-                  <a:srgbClr val="C00000"/>
-                </a:solidFill>
-                <a:latin typeface="Consolas" panose="020B0609020204030204" pitchFamily="49" charset="0"/>
-              </a:rPr>
-              <a:t>::</a:t>
-            </a:r>
-            <a:r>
-              <a:rPr lang="en-US" sz="1600" b="1" dirty="0" err="1">
-                <a:solidFill>
-                  <a:srgbClr val="C00000"/>
-                </a:solidFill>
-                <a:latin typeface="Consolas" panose="020B0609020204030204" pitchFamily="49" charset="0"/>
-              </a:rPr>
-              <a:t>size_t</a:t>
-            </a:r>
-            <a:r>
-              <a:rPr lang="en-US" sz="1600" b="1" dirty="0">
-                <a:solidFill>
-                  <a:srgbClr val="C00000"/>
-                </a:solidFill>
-                <a:latin typeface="Consolas" panose="020B0609020204030204" pitchFamily="49" charset="0"/>
-              </a:rPr>
-              <a:t> </a:t>
-            </a:r>
-            <a:r>
-              <a:rPr lang="en-US" sz="1600" b="1" dirty="0" err="1">
-                <a:solidFill>
-                  <a:srgbClr val="C00000"/>
-                </a:solidFill>
-                <a:latin typeface="Consolas" panose="020B0609020204030204" pitchFamily="49" charset="0"/>
-              </a:rPr>
-              <a:t>i</a:t>
-            </a:r>
-            <a:r>
-              <a:rPr lang="en-US" sz="1600" b="1" dirty="0">
-                <a:solidFill>
-                  <a:srgbClr val="C00000"/>
-                </a:solidFill>
-                <a:latin typeface="Consolas" panose="020B0609020204030204" pitchFamily="49" charset="0"/>
-              </a:rPr>
-              <a:t>) { data[</a:t>
-            </a:r>
-            <a:r>
-              <a:rPr lang="en-US" sz="1600" b="1" dirty="0" err="1">
-                <a:solidFill>
-                  <a:srgbClr val="C00000"/>
-                </a:solidFill>
-                <a:latin typeface="Consolas" panose="020B0609020204030204" pitchFamily="49" charset="0"/>
-              </a:rPr>
-              <a:t>i</a:t>
-            </a:r>
-            <a:r>
-              <a:rPr lang="en-US" sz="1600" b="1" dirty="0">
-                <a:solidFill>
-                  <a:srgbClr val="C00000"/>
-                </a:solidFill>
-                <a:latin typeface="Consolas" panose="020B0609020204030204" pitchFamily="49" charset="0"/>
-              </a:rPr>
-              <a:t>] = data[</a:t>
-            </a:r>
-            <a:r>
-              <a:rPr lang="en-US" sz="1600" b="1" dirty="0" err="1">
-                <a:solidFill>
-                  <a:srgbClr val="C00000"/>
-                </a:solidFill>
-                <a:latin typeface="Consolas" panose="020B0609020204030204" pitchFamily="49" charset="0"/>
-              </a:rPr>
-              <a:t>i</a:t>
-            </a:r>
-            <a:r>
-              <a:rPr lang="en-US" sz="1600" b="1" dirty="0">
-                <a:solidFill>
-                  <a:srgbClr val="C00000"/>
-                </a:solidFill>
-                <a:latin typeface="Consolas" panose="020B0609020204030204" pitchFamily="49" charset="0"/>
-              </a:rPr>
-              <a:t>]*data[</a:t>
-            </a:r>
-            <a:r>
-              <a:rPr lang="en-US" sz="1600" b="1" dirty="0" err="1">
-                <a:solidFill>
-                  <a:srgbClr val="C00000"/>
-                </a:solidFill>
-                <a:latin typeface="Consolas" panose="020B0609020204030204" pitchFamily="49" charset="0"/>
-              </a:rPr>
-              <a:t>i</a:t>
-            </a:r>
-            <a:r>
-              <a:rPr lang="en-US" sz="1600" b="1" dirty="0">
-                <a:solidFill>
-                  <a:srgbClr val="C00000"/>
-                </a:solidFill>
-                <a:latin typeface="Consolas" panose="020B0609020204030204" pitchFamily="49" charset="0"/>
-              </a:rPr>
-              <a:t>]; });</a:t>
-            </a:r>
-          </a:p>
-          <a:p>
-            <a:endParaRPr lang="en-US" sz="1600" dirty="0" smtClean="0">
-              <a:latin typeface="Consolas" panose="020B0609020204030204" pitchFamily="49" charset="0"/>
-            </a:endParaRPr>
-          </a:p>
-          <a:p>
-            <a:r>
-              <a:rPr lang="en-US" sz="1600" dirty="0" smtClean="0">
-                <a:latin typeface="Consolas" panose="020B0609020204030204" pitchFamily="49" charset="0"/>
-              </a:rPr>
-              <a:t>    </a:t>
-            </a:r>
-            <a:r>
-              <a:rPr lang="en-US" sz="1600" dirty="0" err="1" smtClean="0">
-                <a:latin typeface="Consolas" panose="020B0609020204030204" pitchFamily="49" charset="0"/>
-              </a:rPr>
-              <a:t>std</a:t>
-            </a:r>
-            <a:r>
-              <a:rPr lang="en-US" sz="1600" dirty="0">
-                <a:latin typeface="Consolas" panose="020B0609020204030204" pitchFamily="49" charset="0"/>
-              </a:rPr>
-              <a:t>::</a:t>
-            </a:r>
-            <a:r>
-              <a:rPr lang="en-US" sz="1600" dirty="0" err="1">
-                <a:latin typeface="Consolas" panose="020B0609020204030204" pitchFamily="49" charset="0"/>
-              </a:rPr>
-              <a:t>cout</a:t>
-            </a:r>
-            <a:r>
-              <a:rPr lang="en-US" sz="1600" dirty="0">
-                <a:latin typeface="Consolas" panose="020B0609020204030204" pitchFamily="49" charset="0"/>
-              </a:rPr>
-              <a:t> &lt;&lt; </a:t>
-            </a:r>
-            <a:r>
-              <a:rPr lang="en-US" sz="1600" dirty="0" err="1" smtClean="0">
-                <a:latin typeface="Consolas" panose="020B0609020204030204" pitchFamily="49" charset="0"/>
-              </a:rPr>
-              <a:t>data.sum</a:t>
-            </a:r>
-            <a:r>
-              <a:rPr lang="en-US" sz="1600" dirty="0" smtClean="0">
-                <a:latin typeface="Consolas" panose="020B0609020204030204" pitchFamily="49" charset="0"/>
-              </a:rPr>
-              <a:t>() &lt;&lt; </a:t>
-            </a:r>
-            <a:r>
-              <a:rPr lang="en-US" sz="1600" dirty="0" err="1" smtClean="0">
-                <a:latin typeface="Consolas" panose="020B0609020204030204" pitchFamily="49" charset="0"/>
-              </a:rPr>
-              <a:t>std</a:t>
-            </a:r>
-            <a:r>
-              <a:rPr lang="en-US" sz="1600" dirty="0">
-                <a:latin typeface="Consolas" panose="020B0609020204030204" pitchFamily="49" charset="0"/>
-              </a:rPr>
-              <a:t>::</a:t>
-            </a:r>
-            <a:r>
-              <a:rPr lang="en-US" sz="1600" dirty="0" err="1">
-                <a:latin typeface="Consolas" panose="020B0609020204030204" pitchFamily="49" charset="0"/>
-              </a:rPr>
-              <a:t>endl</a:t>
-            </a:r>
-            <a:r>
-              <a:rPr lang="en-US" sz="1600" dirty="0">
-                <a:latin typeface="Consolas" panose="020B0609020204030204" pitchFamily="49" charset="0"/>
-              </a:rPr>
-              <a:t>;</a:t>
-            </a:r>
-          </a:p>
-          <a:p>
-            <a:r>
               <a:rPr lang="en-US" sz="1600" dirty="0">
                 <a:latin typeface="Consolas" panose="020B0609020204030204" pitchFamily="49" charset="0"/>
               </a:rPr>
@@ -11766,63 +12037,203 @@
           </a:p>
         </p:txBody>
       </p:sp>
-      <p:sp>
-        <p:nvSpPr>
-          <p:cNvPr id="6" name="TextBox 5"/>
-          <p:cNvSpPr txBox="1"/>
+      <p:grpSp>
+        <p:nvGrpSpPr>
+          <p:cNvPr id="12" name="Group 11"/>
+          <p:cNvGrpSpPr/>
           <p:nvPr/>
-        </p:nvSpPr>
-        <p:spPr>
+        </p:nvGrpSpPr>
+        <p:grpSpPr>
           <a:xfrm>
-            <a:off x="9153914" y="3927879"/>
-            <a:ext cx="2023439" cy="923330"/>
+            <a:off x="7239699" y="2969703"/>
+            <a:ext cx="3913702" cy="889233"/>
+            <a:chOff x="7239699" y="2969703"/>
+            <a:chExt cx="3913702" cy="889233"/>
           </a:xfrm>
-          <a:prstGeom prst="rect">
-            <a:avLst/>
-          </a:prstGeom>
-        </p:spPr>
-        <p:style>
-          <a:lnRef idx="1">
-            <a:schemeClr val="accent2"/>
-          </a:lnRef>
-          <a:fillRef idx="2">
-            <a:schemeClr val="accent2"/>
-          </a:fillRef>
-          <a:effectRef idx="1">
-            <a:schemeClr val="accent2"/>
-          </a:effectRef>
-          <a:fontRef idx="minor">
-            <a:schemeClr val="dk1"/>
-          </a:fontRef>
-        </p:style>
-        <p:txBody>
-          <a:bodyPr wrap="none" rtlCol="0">
-            <a:spAutoFit/>
-          </a:bodyPr>
-          <a:lstStyle/>
-          <a:p>
-            <a:r>
-              <a:rPr lang="en-US" dirty="0" smtClean="0"/>
-              <a:t>work automatically</a:t>
-            </a:r>
-            <a:br>
-              <a:rPr lang="en-US" dirty="0" smtClean="0"/>
-            </a:br>
-            <a:r>
-              <a:rPr lang="en-US" dirty="0" smtClean="0"/>
-              <a:t>divided over thread</a:t>
-            </a:r>
-            <a:br>
-              <a:rPr lang="en-US" dirty="0" smtClean="0"/>
-            </a:br>
-            <a:r>
-              <a:rPr lang="en-US" dirty="0" smtClean="0"/>
-              <a:t>pool</a:t>
-            </a:r>
-            <a:endParaRPr lang="en-US" dirty="0"/>
-          </a:p>
-        </p:txBody>
-      </p:sp>
+        </p:grpSpPr>
+        <p:sp>
+          <p:nvSpPr>
+            <p:cNvPr id="3" name="TextBox 2"/>
+            <p:cNvSpPr txBox="1"/>
+            <p:nvPr/>
+          </p:nvSpPr>
+          <p:spPr>
+            <a:xfrm>
+              <a:off x="8388990" y="2969703"/>
+              <a:ext cx="2764411" cy="369332"/>
+            </a:xfrm>
+            <a:prstGeom prst="rect">
+              <a:avLst/>
+            </a:prstGeom>
+          </p:spPr>
+          <p:style>
+            <a:lnRef idx="1">
+              <a:schemeClr val="accent1"/>
+            </a:lnRef>
+            <a:fillRef idx="2">
+              <a:schemeClr val="accent1"/>
+            </a:fillRef>
+            <a:effectRef idx="1">
+              <a:schemeClr val="accent1"/>
+            </a:effectRef>
+            <a:fontRef idx="minor">
+              <a:schemeClr val="dk1"/>
+            </a:fontRef>
+          </p:style>
+          <p:txBody>
+            <a:bodyPr wrap="none" rtlCol="0">
+              <a:spAutoFit/>
+            </a:bodyPr>
+            <a:lstStyle/>
+            <a:p>
+              <a:r>
+                <a:rPr lang="en-US" dirty="0" smtClean="0"/>
+                <a:t>reduction of </a:t>
+              </a:r>
+              <a:r>
+                <a:rPr lang="en-US" dirty="0" err="1" smtClean="0"/>
+                <a:t>blocked_range</a:t>
+              </a:r>
+              <a:endParaRPr lang="en-US" dirty="0"/>
+            </a:p>
+          </p:txBody>
+        </p:sp>
+        <p:cxnSp>
+          <p:nvCxnSpPr>
+            <p:cNvPr id="9" name="Straight Arrow Connector 8"/>
+            <p:cNvCxnSpPr>
+              <a:stCxn id="3" idx="1"/>
+            </p:cNvCxnSpPr>
+            <p:nvPr/>
+          </p:nvCxnSpPr>
+          <p:spPr>
+            <a:xfrm flipH="1">
+              <a:off x="7239699" y="3154369"/>
+              <a:ext cx="1149291" cy="704567"/>
+            </a:xfrm>
+            <a:prstGeom prst="straightConnector1">
+              <a:avLst/>
+            </a:prstGeom>
+            <a:ln w="19050">
+              <a:tailEnd type="stealth" w="lg" len="lg"/>
+            </a:ln>
+          </p:spPr>
+          <p:style>
+            <a:lnRef idx="1">
+              <a:schemeClr val="accent1"/>
+            </a:lnRef>
+            <a:fillRef idx="0">
+              <a:schemeClr val="accent1"/>
+            </a:fillRef>
+            <a:effectRef idx="0">
+              <a:schemeClr val="accent1"/>
+            </a:effectRef>
+            <a:fontRef idx="minor">
+              <a:schemeClr val="tx1"/>
+            </a:fontRef>
+          </p:style>
+        </p:cxnSp>
+      </p:grpSp>
+      <p:grpSp>
+        <p:nvGrpSpPr>
+          <p:cNvPr id="16" name="Group 15"/>
+          <p:cNvGrpSpPr/>
+          <p:nvPr/>
+        </p:nvGrpSpPr>
+        <p:grpSpPr>
+          <a:xfrm>
+            <a:off x="7239699" y="5430459"/>
+            <a:ext cx="3913701" cy="646331"/>
+            <a:chOff x="7239699" y="5430459"/>
+            <a:chExt cx="3913701" cy="646331"/>
+          </a:xfrm>
+        </p:grpSpPr>
+        <p:sp>
+          <p:nvSpPr>
+            <p:cNvPr id="7" name="TextBox 6"/>
+            <p:cNvSpPr txBox="1"/>
+            <p:nvPr/>
+          </p:nvSpPr>
+          <p:spPr>
+            <a:xfrm>
+              <a:off x="8388989" y="5430459"/>
+              <a:ext cx="2764411" cy="646331"/>
+            </a:xfrm>
+            <a:prstGeom prst="rect">
+              <a:avLst/>
+            </a:prstGeom>
+          </p:spPr>
+          <p:style>
+            <a:lnRef idx="1">
+              <a:schemeClr val="accent1"/>
+            </a:lnRef>
+            <a:fillRef idx="2">
+              <a:schemeClr val="accent1"/>
+            </a:fillRef>
+            <a:effectRef idx="1">
+              <a:schemeClr val="accent1"/>
+            </a:effectRef>
+            <a:fontRef idx="minor">
+              <a:schemeClr val="dk1"/>
+            </a:fontRef>
+          </p:style>
+          <p:txBody>
+            <a:bodyPr wrap="square" rtlCol="0">
+              <a:spAutoFit/>
+            </a:bodyPr>
+            <a:lstStyle/>
+            <a:p>
+              <a:r>
+                <a:rPr lang="en-US" dirty="0" smtClean="0"/>
+                <a:t>reduction of </a:t>
+              </a:r>
+              <a:r>
+                <a:rPr lang="en-US" dirty="0" err="1" smtClean="0"/>
+                <a:t>blocked_range</a:t>
+              </a:r>
+              <a:r>
+                <a:rPr lang="en-US" dirty="0" smtClean="0"/>
+                <a:t> results</a:t>
+              </a:r>
+            </a:p>
+          </p:txBody>
+        </p:sp>
+        <p:cxnSp>
+          <p:nvCxnSpPr>
+            <p:cNvPr id="13" name="Straight Arrow Connector 12"/>
+            <p:cNvCxnSpPr>
+              <a:stCxn id="7" idx="1"/>
+            </p:cNvCxnSpPr>
+            <p:nvPr/>
+          </p:nvCxnSpPr>
+          <p:spPr>
+            <a:xfrm flipH="1" flipV="1">
+              <a:off x="7239699" y="5623034"/>
+              <a:ext cx="1149290" cy="130591"/>
+            </a:xfrm>
+            <a:prstGeom prst="straightConnector1">
+              <a:avLst/>
+            </a:prstGeom>
+            <a:ln w="19050">
+              <a:tailEnd type="stealth" w="lg" len="lg"/>
+            </a:ln>
+          </p:spPr>
+          <p:style>
+            <a:lnRef idx="1">
+              <a:schemeClr val="accent1"/>
+            </a:lnRef>
+            <a:fillRef idx="0">
+              <a:schemeClr val="accent1"/>
+            </a:fillRef>
+            <a:effectRef idx="0">
+              <a:schemeClr val="accent1"/>
+            </a:effectRef>
+            <a:fontRef idx="minor">
+              <a:schemeClr val="tx1"/>
+            </a:fontRef>
+          </p:style>
+        </p:cxnSp>
+      </p:grpSp>
     </p:spTree>
     <p:extLst>
       <p:ext uri="{BB962C8B-B14F-4D97-AF65-F5344CB8AC3E}">

</xml_diff>

<commit_message>
Add refereence to Pro TBB book
</commit_message>
<xml_diff>
--- a/CPlusPlus/Tbb/tbb.pptx
+++ b/CPlusPlus/Tbb/tbb.pptx
@@ -188,7 +188,6 @@
           </a:p>
         </c:rich>
       </c:tx>
-      <c:layout/>
       <c:overlay val="0"/>
       <c:spPr>
         <a:noFill/>
@@ -649,7 +648,6 @@
     </c:plotArea>
     <c:legend>
       <c:legendPos val="b"/>
-      <c:layout/>
       <c:overlay val="0"/>
       <c:spPr>
         <a:noFill/>
@@ -746,7 +744,6 @@
           </a:p>
         </c:rich>
       </c:tx>
-      <c:layout/>
       <c:overlay val="0"/>
       <c:spPr>
         <a:noFill/>
@@ -1198,7 +1195,6 @@
     </c:plotArea>
     <c:legend>
       <c:legendPos val="b"/>
-      <c:layout/>
       <c:overlay val="0"/>
       <c:spPr>
         <a:noFill/>
@@ -7968,7 +7964,7 @@
           <a:p>
             <a:fld id="{72A559F6-5B7D-4313-A416-AF59A4E68915}" type="datetimeFigureOut">
               <a:rPr lang="en-US" smtClean="0"/>
-              <a:t>2019-06-04</a:t>
+              <a:t>2019-08-23</a:t>
             </a:fld>
             <a:endParaRPr lang="en-US"/>
           </a:p>
@@ -8367,7 +8363,7 @@
           <a:p>
             <a:fld id="{10BAA852-CFF9-48BA-A628-AE9DB7CB9A88}" type="datetime1">
               <a:rPr lang="en-US" smtClean="0"/>
-              <a:t>2019-06-04</a:t>
+              <a:t>2019-08-23</a:t>
             </a:fld>
             <a:endParaRPr lang="en-US"/>
           </a:p>
@@ -8537,7 +8533,7 @@
           <a:p>
             <a:fld id="{6AE9B819-3E52-43A1-8A40-2B7C4C434AEB}" type="datetime1">
               <a:rPr lang="en-US" smtClean="0"/>
-              <a:t>2019-06-04</a:t>
+              <a:t>2019-08-23</a:t>
             </a:fld>
             <a:endParaRPr lang="en-US"/>
           </a:p>
@@ -8717,7 +8713,7 @@
           <a:p>
             <a:fld id="{8E838FA6-5F9F-4ECF-8918-25AD07791A8E}" type="datetime1">
               <a:rPr lang="en-US" smtClean="0"/>
-              <a:t>2019-06-04</a:t>
+              <a:t>2019-08-23</a:t>
             </a:fld>
             <a:endParaRPr lang="en-US"/>
           </a:p>
@@ -8977,7 +8973,7 @@
           <a:p>
             <a:fld id="{E8BA1A0E-364C-4183-A995-0F7F3E7596BF}" type="datetime1">
               <a:rPr lang="en-US" smtClean="0"/>
-              <a:t>2019-06-04</a:t>
+              <a:t>2019-08-23</a:t>
             </a:fld>
             <a:endParaRPr lang="en-US"/>
           </a:p>
@@ -10482,7 +10478,7 @@
           <a:p>
             <a:fld id="{4940FBB2-602E-4B42-A747-9CF7EF118304}" type="datetime1">
               <a:rPr lang="en-US" smtClean="0"/>
-              <a:t>2019-06-04</a:t>
+              <a:t>2019-08-23</a:t>
             </a:fld>
             <a:endParaRPr lang="en-US"/>
           </a:p>
@@ -12583,7 +12579,7 @@
           <a:p>
             <a:fld id="{4AB9213C-A76D-4936-9EE8-1986AC361683}" type="datetime1">
               <a:rPr lang="en-US" smtClean="0"/>
-              <a:t>2019-06-04</a:t>
+              <a:t>2019-08-23</a:t>
             </a:fld>
             <a:endParaRPr lang="en-US"/>
           </a:p>
@@ -12853,7 +12849,7 @@
           <a:p>
             <a:fld id="{14EFB339-1FD7-4DAE-BB11-806F6BD9CFA9}" type="datetime1">
               <a:rPr lang="en-US" smtClean="0"/>
-              <a:t>2019-06-04</a:t>
+              <a:t>2019-08-23</a:t>
             </a:fld>
             <a:endParaRPr lang="en-US"/>
           </a:p>
@@ -13220,7 +13216,7 @@
           <a:p>
             <a:fld id="{0E1F55F6-D9C4-4241-908D-398DED6EBAB1}" type="datetime1">
               <a:rPr lang="en-US" smtClean="0"/>
-              <a:t>2019-06-04</a:t>
+              <a:t>2019-08-23</a:t>
             </a:fld>
             <a:endParaRPr lang="en-US"/>
           </a:p>
@@ -13338,7 +13334,7 @@
           <a:p>
             <a:fld id="{92FB5E62-F774-4F65-B3A2-2213C25A5AEA}" type="datetime1">
               <a:rPr lang="en-US" smtClean="0"/>
-              <a:t>2019-06-04</a:t>
+              <a:t>2019-08-23</a:t>
             </a:fld>
             <a:endParaRPr lang="en-US"/>
           </a:p>
@@ -13433,7 +13429,7 @@
           <a:p>
             <a:fld id="{4CED0878-CF1B-49ED-AD4E-5ED3D953F768}" type="datetime1">
               <a:rPr lang="en-US" smtClean="0"/>
-              <a:t>2019-06-04</a:t>
+              <a:t>2019-08-23</a:t>
             </a:fld>
             <a:endParaRPr lang="en-US"/>
           </a:p>
@@ -13710,7 +13706,7 @@
           <a:p>
             <a:fld id="{B3D32334-80A3-4CEF-85FC-5DDF56E1E7C0}" type="datetime1">
               <a:rPr lang="en-US" smtClean="0"/>
-              <a:t>2019-06-04</a:t>
+              <a:t>2019-08-23</a:t>
             </a:fld>
             <a:endParaRPr lang="en-US"/>
           </a:p>
@@ -13963,7 +13959,7 @@
           <a:p>
             <a:fld id="{CA404258-DD8C-4FD4-A6A9-83DE392C6C3F}" type="datetime1">
               <a:rPr lang="en-US" smtClean="0"/>
-              <a:t>2019-06-04</a:t>
+              <a:t>2019-08-23</a:t>
             </a:fld>
             <a:endParaRPr lang="en-US"/>
           </a:p>
@@ -14176,7 +14172,7 @@
           <a:p>
             <a:fld id="{80333226-38AF-4D55-9F51-5A04A4858D36}" type="datetime1">
               <a:rPr lang="en-US" smtClean="0"/>
-              <a:t>2019-06-04</a:t>
+              <a:t>2019-08-23</a:t>
             </a:fld>
             <a:endParaRPr lang="en-US"/>
           </a:p>
@@ -36086,7 +36082,7 @@
         <p:spPr/>
         <p:txBody>
           <a:bodyPr>
-            <a:normAutofit fontScale="92500"/>
+            <a:normAutofit fontScale="92500" lnSpcReduction="10000"/>
           </a:bodyPr>
           <a:lstStyle/>
           <a:p>
@@ -36126,14 +36122,49 @@
           <a:p>
             <a:r>
               <a:rPr lang="en-US" dirty="0" smtClean="0"/>
-              <a:t>Book:</a:t>
+              <a:t>Books:</a:t>
+            </a:r>
+            <a:endParaRPr lang="en-US" dirty="0"/>
+          </a:p>
+          <a:p>
+            <a:pPr lvl="1"/>
+            <a:r>
+              <a:rPr lang="en-US" i="1" dirty="0" smtClean="0"/>
+              <a:t>Intel </a:t>
+            </a:r>
+            <a:r>
+              <a:rPr lang="en-US" i="1" dirty="0" smtClean="0"/>
+              <a:t>Threading Building Blocks: outfitting C++ for multi-core parallelism</a:t>
+            </a:r>
+            <a:r>
+              <a:rPr lang="en-US" dirty="0" smtClean="0"/>
+              <a:t/>
             </a:r>
             <a:br>
               <a:rPr lang="en-US" dirty="0" smtClean="0"/>
             </a:br>
             <a:r>
+              <a:rPr lang="en-US" dirty="0" smtClean="0"/>
+              <a:t>James </a:t>
+            </a:r>
+            <a:r>
+              <a:rPr lang="en-US" dirty="0" err="1" smtClean="0"/>
+              <a:t>Reinders</a:t>
+            </a:r>
+            <a:r>
+              <a:rPr lang="en-US" dirty="0" smtClean="0"/>
+              <a:t>, 2010, </a:t>
+            </a:r>
+            <a:r>
+              <a:rPr lang="en-US" dirty="0" smtClean="0"/>
+              <a:t>O'Reilly</a:t>
+            </a:r>
+          </a:p>
+          <a:p>
+            <a:pPr lvl="1"/>
+            <a:r>
               <a:rPr lang="en-US" i="1" dirty="0" smtClean="0"/>
-              <a:t>Intel Threading Building Blocks: outfitting C++ for multi-core parallelism</a:t>
+              <a:t>Pro TBB: C++ parallel programming with Threading Building Blocks</a:t>
             </a:r>
             <a:r>
               <a:rPr lang="en-US" dirty="0" smtClean="0"/>
@@ -36144,7 +36175,15 @@
             </a:br>
             <a:r>
               <a:rPr lang="en-US" dirty="0" smtClean="0"/>
-              <a:t>James </a:t>
+              <a:t>Michael Voss, Rafael </a:t>
+            </a:r>
+            <a:r>
+              <a:rPr lang="en-US" dirty="0" err="1" smtClean="0"/>
+              <a:t>Asenjo</a:t>
+            </a:r>
+            <a:r>
+              <a:rPr lang="en-US" dirty="0" smtClean="0"/>
+              <a:t>, James </a:t>
             </a:r>
             <a:r>
               <a:rPr lang="en-US" dirty="0" err="1" smtClean="0"/>
@@ -36152,7 +36191,15 @@
             </a:r>
             <a:r>
               <a:rPr lang="en-US" dirty="0" smtClean="0"/>
-              <a:t>, 2010, O'Reilly</a:t>
+              <a:t>, 2019, </a:t>
+            </a:r>
+            <a:r>
+              <a:rPr lang="en-US" dirty="0" err="1" smtClean="0"/>
+              <a:t>Apress</a:t>
+            </a:r>
+            <a:r>
+              <a:rPr lang="en-US" dirty="0" smtClean="0"/>
+              <a:t> Open</a:t>
             </a:r>
             <a:endParaRPr lang="en-US" dirty="0"/>
           </a:p>

</xml_diff>